<commit_message>
Added github info, zip file, and minor adjustments to reqs and code
</commit_message>
<xml_diff>
--- a/FFXIV_Blended_Icons.pptx
+++ b/FFXIV_Blended_Icons.pptx
@@ -6,7 +6,6 @@
   </p:sldMasterIdLst>
   <p:sldIdLst>
     <p:sldId id="256" r:id="rId2"/>
-    <p:sldId id="257" r:id="rId3"/>
   </p:sldIdLst>
   <p:sldSz cx="12192000" cy="6858000"/>
   <p:notesSz cx="6858000" cy="9144000"/>
@@ -105,6 +104,11 @@
       </a:defRPr>
     </a:lvl9pPr>
   </p:defaultTextStyle>
+  <p:extLst>
+    <p:ext uri="{EFAFB233-063F-42B5-8137-9DF3F51BA10A}">
+      <p15:sldGuideLst xmlns:p15="http://schemas.microsoft.com/office/powerpoint/2012/main"/>
+    </p:ext>
+  </p:extLst>
 </p:presentation>
 </file>
 
@@ -6156,8 +6160,8 @@
         </p:nvSpPr>
         <p:spPr>
           <a:xfrm>
-            <a:off x="5842311" y="382909"/>
-            <a:ext cx="3235217" cy="2739211"/>
+            <a:off x="5776139" y="356013"/>
+            <a:ext cx="3361943" cy="2739211"/>
           </a:xfrm>
           <a:prstGeom prst="rect">
             <a:avLst/>
@@ -7222,90 +7226,45 @@
           </a:p>
         </p:txBody>
       </p:sp>
+      <p:sp>
+        <p:nvSpPr>
+          <p:cNvPr id="106" name="TextBox 105">
+            <a:extLst>
+              <a:ext uri="{FF2B5EF4-FFF2-40B4-BE49-F238E27FC236}">
+                <a16:creationId xmlns:a16="http://schemas.microsoft.com/office/drawing/2014/main" id="{18A12C02-A928-42AD-996D-A3A6EA465D14}"/>
+              </a:ext>
+            </a:extLst>
+          </p:cNvPr>
+          <p:cNvSpPr txBox="1"/>
+          <p:nvPr/>
+        </p:nvSpPr>
+        <p:spPr>
+          <a:xfrm>
+            <a:off x="200153" y="6472885"/>
+            <a:ext cx="2820825" cy="230832"/>
+          </a:xfrm>
+          <a:prstGeom prst="rect">
+            <a:avLst/>
+          </a:prstGeom>
+          <a:noFill/>
+        </p:spPr>
+        <p:txBody>
+          <a:bodyPr wrap="square">
+            <a:spAutoFit/>
+          </a:bodyPr>
+          <a:lstStyle/>
+          <a:p>
+            <a:r>
+              <a:rPr lang="en-US" sz="900" dirty="0"/>
+              <a:t>https://github.com/jonstrutz11/ffxiv-blended-job-icons</a:t>
+            </a:r>
+          </a:p>
+        </p:txBody>
+      </p:sp>
     </p:spTree>
     <p:extLst>
       <p:ext uri="{BB962C8B-B14F-4D97-AF65-F5344CB8AC3E}">
         <p14:creationId xmlns:p14="http://schemas.microsoft.com/office/powerpoint/2010/main" val="2222162067"/>
-      </p:ext>
-    </p:extLst>
-  </p:cSld>
-  <p:clrMapOvr>
-    <a:masterClrMapping/>
-  </p:clrMapOvr>
-</p:sld>
-</file>
-
-<file path=ppt/slides/slide2.xml><?xml version="1.0" encoding="utf-8"?>
-<p:sld xmlns:a="http://schemas.openxmlformats.org/drawingml/2006/main" xmlns:r="http://schemas.openxmlformats.org/officeDocument/2006/relationships" xmlns:p="http://schemas.openxmlformats.org/presentationml/2006/main">
-  <p:cSld>
-    <p:spTree>
-      <p:nvGrpSpPr>
-        <p:cNvPr id="1" name=""/>
-        <p:cNvGrpSpPr/>
-        <p:nvPr/>
-      </p:nvGrpSpPr>
-      <p:grpSpPr>
-        <a:xfrm>
-          <a:off x="0" y="0"/>
-          <a:ext cx="0" cy="0"/>
-          <a:chOff x="0" y="0"/>
-          <a:chExt cx="0" cy="0"/>
-        </a:xfrm>
-      </p:grpSpPr>
-      <p:sp>
-        <p:nvSpPr>
-          <p:cNvPr id="2" name="Title 1">
-            <a:extLst>
-              <a:ext uri="{FF2B5EF4-FFF2-40B4-BE49-F238E27FC236}">
-                <a16:creationId xmlns:a16="http://schemas.microsoft.com/office/drawing/2014/main" id="{4C29EE11-391C-4B62-96C4-8F33005A71CC}"/>
-              </a:ext>
-            </a:extLst>
-          </p:cNvPr>
-          <p:cNvSpPr>
-            <a:spLocks noGrp="1"/>
-          </p:cNvSpPr>
-          <p:nvPr>
-            <p:ph type="title"/>
-          </p:nvPr>
-        </p:nvSpPr>
-        <p:spPr/>
-        <p:txBody>
-          <a:bodyPr/>
-          <a:lstStyle/>
-          <a:p>
-            <a:endParaRPr lang="en-US"/>
-          </a:p>
-        </p:txBody>
-      </p:sp>
-      <p:sp>
-        <p:nvSpPr>
-          <p:cNvPr id="3" name="Content Placeholder 2">
-            <a:extLst>
-              <a:ext uri="{FF2B5EF4-FFF2-40B4-BE49-F238E27FC236}">
-                <a16:creationId xmlns:a16="http://schemas.microsoft.com/office/drawing/2014/main" id="{A4E623E5-F425-4BC0-A33E-BFB1C2B699EC}"/>
-              </a:ext>
-            </a:extLst>
-          </p:cNvPr>
-          <p:cNvSpPr>
-            <a:spLocks noGrp="1"/>
-          </p:cNvSpPr>
-          <p:nvPr>
-            <p:ph idx="1"/>
-          </p:nvPr>
-        </p:nvSpPr>
-        <p:spPr/>
-        <p:txBody>
-          <a:bodyPr/>
-          <a:lstStyle/>
-          <a:p>
-            <a:endParaRPr lang="en-US"/>
-          </a:p>
-        </p:txBody>
-      </p:sp>
-    </p:spTree>
-    <p:extLst>
-      <p:ext uri="{BB962C8B-B14F-4D97-AF65-F5344CB8AC3E}">
-        <p14:creationId xmlns:p14="http://schemas.microsoft.com/office/powerpoint/2010/main" val="552914062"/>
       </p:ext>
     </p:extLst>
   </p:cSld>

</xml_diff>